<commit_message>
keeping the PPT up to date
</commit_message>
<xml_diff>
--- a/PP_notenbonus.pptx
+++ b/PP_notenbonus.pptx
@@ -8787,6 +8787,36 @@
           </a:p>
         </p:txBody>
       </p:sp>
+      <p:pic>
+        <p:nvPicPr>
+          <p:cNvPr id="5" name="Grafik 4">
+            <a:extLst>
+              <a:ext uri="{FF2B5EF4-FFF2-40B4-BE49-F238E27FC236}">
+                <a16:creationId xmlns:a16="http://schemas.microsoft.com/office/drawing/2014/main" id="{F34106F0-6CC1-7E45-A429-47EA60503F92}"/>
+              </a:ext>
+            </a:extLst>
+          </p:cNvPr>
+          <p:cNvPicPr>
+            <a:picLocks noChangeAspect="1"/>
+          </p:cNvPicPr>
+          <p:nvPr/>
+        </p:nvPicPr>
+        <p:blipFill>
+          <a:blip r:embed="rId2"/>
+          <a:stretch>
+            <a:fillRect/>
+          </a:stretch>
+        </p:blipFill>
+        <p:spPr>
+          <a:xfrm>
+            <a:off x="657230" y="1870980"/>
+            <a:ext cx="7829539" cy="1401539"/>
+          </a:xfrm>
+          <a:prstGeom prst="rect">
+            <a:avLst/>
+          </a:prstGeom>
+        </p:spPr>
+      </p:pic>
     </p:spTree>
     <p:extLst>
       <p:ext uri="{BB962C8B-B14F-4D97-AF65-F5344CB8AC3E}">

</xml_diff>

<commit_message>
SVG code zur PPT hinzugefügt
</commit_message>
<xml_diff>
--- a/PP_notenbonus.pptx
+++ b/PP_notenbonus.pptx
@@ -10,10 +10,10 @@
     <p:sldMasterId id="2147483697" r:id="rId6"/>
   </p:sldMasterIdLst>
   <p:notesMasterIdLst>
-    <p:notesMasterId r:id="rId16"/>
+    <p:notesMasterId r:id="rId17"/>
   </p:notesMasterIdLst>
   <p:handoutMasterIdLst>
-    <p:handoutMasterId r:id="rId17"/>
+    <p:handoutMasterId r:id="rId18"/>
   </p:handoutMasterIdLst>
   <p:sldIdLst>
     <p:sldId id="356" r:id="rId7"/>
@@ -24,12 +24,13 @@
     <p:sldId id="370" r:id="rId12"/>
     <p:sldId id="372" r:id="rId13"/>
     <p:sldId id="373" r:id="rId14"/>
-    <p:sldId id="279" r:id="rId15"/>
+    <p:sldId id="377" r:id="rId15"/>
+    <p:sldId id="279" r:id="rId16"/>
   </p:sldIdLst>
   <p:sldSz cx="9144000" cy="5143500" type="screen16x9"/>
   <p:notesSz cx="9925050" cy="6665913"/>
   <p:custDataLst>
-    <p:tags r:id="rId18"/>
+    <p:tags r:id="rId19"/>
   </p:custDataLst>
   <p:defaultTextStyle>
     <a:defPPr>
@@ -303,7 +304,7 @@
               <a:pPr>
                 <a:defRPr/>
               </a:pPr>
-              <a:t>25/11/2019</a:t>
+              <a:t>26/11/2019</a:t>
             </a:fld>
             <a:endParaRPr lang="en-GB"/>
           </a:p>
@@ -522,7 +523,7 @@
               <a:pPr>
                 <a:defRPr/>
               </a:pPr>
-              <a:t>25/11/2019</a:t>
+              <a:t>26/11/2019</a:t>
             </a:fld>
             <a:endParaRPr lang="en-GB"/>
           </a:p>
@@ -2836,7 +2837,7 @@
           <a:p>
             <a:fld id="{7A56DD26-32A4-2A43-990A-6F7E5E73786E}" type="datetimeFigureOut">
               <a:rPr lang="en-US" smtClean="0"/>
-              <a:t>11/25/19</a:t>
+              <a:t>11/26/19</a:t>
             </a:fld>
             <a:endParaRPr lang="en-US"/>
           </a:p>
@@ -8155,6 +8156,559 @@
             <a:r>
               <a:rPr lang="de-DE" dirty="0"/>
               <a:t> Dokumentation</a:t>
+            </a:r>
+          </a:p>
+        </p:txBody>
+      </p:sp>
+    </p:spTree>
+  </p:cSld>
+  <p:clrMapOvr>
+    <a:masterClrMapping/>
+  </p:clrMapOvr>
+</p:sld>
+</file>
+
+<file path=ppt/slides/slide10.xml><?xml version="1.0" encoding="utf-8"?>
+<p:sld xmlns:a="http://schemas.openxmlformats.org/drawingml/2006/main" xmlns:r="http://schemas.openxmlformats.org/officeDocument/2006/relationships" xmlns:p="http://schemas.openxmlformats.org/presentationml/2006/main">
+  <p:cSld>
+    <p:spTree>
+      <p:nvGrpSpPr>
+        <p:cNvPr id="1" name=""/>
+        <p:cNvGrpSpPr/>
+        <p:nvPr/>
+      </p:nvGrpSpPr>
+      <p:grpSpPr>
+        <a:xfrm>
+          <a:off x="0" y="0"/>
+          <a:ext cx="0" cy="0"/>
+          <a:chOff x="0" y="0"/>
+          <a:chExt cx="0" cy="0"/>
+        </a:xfrm>
+      </p:grpSpPr>
+      <p:sp>
+        <p:nvSpPr>
+          <p:cNvPr id="180" name="Freeform 180"/>
+          <p:cNvSpPr/>
+          <p:nvPr/>
+        </p:nvSpPr>
+        <p:spPr>
+          <a:xfrm>
+            <a:off x="8210550" y="311150"/>
+            <a:ext cx="603250" cy="323850"/>
+          </a:xfrm>
+          <a:custGeom>
+            <a:avLst/>
+            <a:gdLst>
+              <a:gd name="connsiteX0" fmla="*/ 8308 w 603250"/>
+              <a:gd name="connsiteY0" fmla="*/ 13394 h 323850"/>
+              <a:gd name="connsiteX1" fmla="*/ 245253 w 603250"/>
+              <a:gd name="connsiteY1" fmla="*/ 13394 h 323850"/>
+              <a:gd name="connsiteX2" fmla="*/ 245254 w 603250"/>
+              <a:gd name="connsiteY2" fmla="*/ 274824 h 323850"/>
+              <a:gd name="connsiteX3" fmla="*/ 310553 w 603250"/>
+              <a:gd name="connsiteY3" fmla="*/ 274824 h 323850"/>
+              <a:gd name="connsiteX4" fmla="*/ 310553 w 603250"/>
+              <a:gd name="connsiteY4" fmla="*/ 13394 h 323850"/>
+              <a:gd name="connsiteX5" fmla="*/ 613305 w 603250"/>
+              <a:gd name="connsiteY5" fmla="*/ 13394 h 323850"/>
+              <a:gd name="connsiteX6" fmla="*/ 613305 w 603250"/>
+              <a:gd name="connsiteY6" fmla="*/ 331987 h 323850"/>
+              <a:gd name="connsiteX7" fmla="*/ 556135 w 603250"/>
+              <a:gd name="connsiteY7" fmla="*/ 331987 h 323850"/>
+              <a:gd name="connsiteX8" fmla="*/ 556135 w 603250"/>
+              <a:gd name="connsiteY8" fmla="*/ 70559 h 323850"/>
+              <a:gd name="connsiteX9" fmla="*/ 490453 w 603250"/>
+              <a:gd name="connsiteY9" fmla="*/ 70559 h 323850"/>
+              <a:gd name="connsiteX10" fmla="*/ 490454 w 603250"/>
+              <a:gd name="connsiteY10" fmla="*/ 331987 h 323850"/>
+              <a:gd name="connsiteX11" fmla="*/ 433283 w 603250"/>
+              <a:gd name="connsiteY11" fmla="*/ 331987 h 323850"/>
+              <a:gd name="connsiteX12" fmla="*/ 433283 w 603250"/>
+              <a:gd name="connsiteY12" fmla="*/ 70559 h 323850"/>
+              <a:gd name="connsiteX13" fmla="*/ 367724 w 603250"/>
+              <a:gd name="connsiteY13" fmla="*/ 70558 h 323850"/>
+              <a:gd name="connsiteX14" fmla="*/ 367724 w 603250"/>
+              <a:gd name="connsiteY14" fmla="*/ 331987 h 323850"/>
+              <a:gd name="connsiteX15" fmla="*/ 187951 w 603250"/>
+              <a:gd name="connsiteY15" fmla="*/ 331987 h 323850"/>
+              <a:gd name="connsiteX16" fmla="*/ 187951 w 603250"/>
+              <a:gd name="connsiteY16" fmla="*/ 70558 h 323850"/>
+              <a:gd name="connsiteX17" fmla="*/ 122651 w 603250"/>
+              <a:gd name="connsiteY17" fmla="*/ 70558 h 323850"/>
+              <a:gd name="connsiteX18" fmla="*/ 122651 w 603250"/>
+              <a:gd name="connsiteY18" fmla="*/ 331987 h 323850"/>
+              <a:gd name="connsiteX19" fmla="*/ 65481 w 603250"/>
+              <a:gd name="connsiteY19" fmla="*/ 331987 h 323850"/>
+              <a:gd name="connsiteX20" fmla="*/ 65480 w 603250"/>
+              <a:gd name="connsiteY20" fmla="*/ 70558 h 323850"/>
+              <a:gd name="connsiteX21" fmla="*/ 8308 w 603250"/>
+              <a:gd name="connsiteY21" fmla="*/ 70558 h 323850"/>
+              <a:gd name="connsiteX22" fmla="*/ 8308 w 603250"/>
+              <a:gd name="connsiteY22" fmla="*/ 13394 h 323850"/>
+            </a:gdLst>
+            <a:ahLst/>
+            <a:cxnLst>
+              <a:cxn ang="0">
+                <a:pos x="connsiteX0" y="connsiteY0"/>
+              </a:cxn>
+              <a:cxn ang="0">
+                <a:pos x="connsiteX1" y="connsiteY1"/>
+              </a:cxn>
+              <a:cxn ang="0">
+                <a:pos x="connsiteX2" y="connsiteY2"/>
+              </a:cxn>
+              <a:cxn ang="0">
+                <a:pos x="connsiteX3" y="connsiteY3"/>
+              </a:cxn>
+              <a:cxn ang="0">
+                <a:pos x="connsiteX4" y="connsiteY4"/>
+              </a:cxn>
+              <a:cxn ang="0">
+                <a:pos x="connsiteX5" y="connsiteY5"/>
+              </a:cxn>
+              <a:cxn ang="0">
+                <a:pos x="connsiteX6" y="connsiteY6"/>
+              </a:cxn>
+              <a:cxn ang="0">
+                <a:pos x="connsiteX7" y="connsiteY7"/>
+              </a:cxn>
+              <a:cxn ang="0">
+                <a:pos x="connsiteX8" y="connsiteY8"/>
+              </a:cxn>
+              <a:cxn ang="0">
+                <a:pos x="connsiteX9" y="connsiteY9"/>
+              </a:cxn>
+              <a:cxn ang="0">
+                <a:pos x="connsiteX10" y="connsiteY10"/>
+              </a:cxn>
+              <a:cxn ang="0">
+                <a:pos x="connsiteX11" y="connsiteY11"/>
+              </a:cxn>
+              <a:cxn ang="0">
+                <a:pos x="connsiteX12" y="connsiteY12"/>
+              </a:cxn>
+              <a:cxn ang="0">
+                <a:pos x="connsiteX13" y="connsiteY13"/>
+              </a:cxn>
+              <a:cxn ang="0">
+                <a:pos x="connsiteX14" y="connsiteY14"/>
+              </a:cxn>
+              <a:cxn ang="0">
+                <a:pos x="connsiteX15" y="connsiteY15"/>
+              </a:cxn>
+              <a:cxn ang="0">
+                <a:pos x="connsiteX16" y="connsiteY16"/>
+              </a:cxn>
+              <a:cxn ang="0">
+                <a:pos x="connsiteX17" y="connsiteY17"/>
+              </a:cxn>
+              <a:cxn ang="0">
+                <a:pos x="connsiteX18" y="connsiteY18"/>
+              </a:cxn>
+              <a:cxn ang="0">
+                <a:pos x="connsiteX19" y="connsiteY19"/>
+              </a:cxn>
+              <a:cxn ang="0">
+                <a:pos x="connsiteX20" y="connsiteY20"/>
+              </a:cxn>
+              <a:cxn ang="0">
+                <a:pos x="connsiteX21" y="connsiteY21"/>
+              </a:cxn>
+              <a:cxn ang="0">
+                <a:pos x="connsiteX22" y="connsiteY22"/>
+              </a:cxn>
+            </a:cxnLst>
+            <a:rect l="l" t="t" r="r" b="b"/>
+            <a:pathLst>
+              <a:path w="603250" h="323850">
+                <a:moveTo>
+                  <a:pt x="8308" y="13394"/>
+                </a:moveTo>
+                <a:lnTo>
+                  <a:pt x="245253" y="13394"/>
+                </a:lnTo>
+                <a:lnTo>
+                  <a:pt x="245254" y="274824"/>
+                </a:lnTo>
+                <a:lnTo>
+                  <a:pt x="310553" y="274824"/>
+                </a:lnTo>
+                <a:lnTo>
+                  <a:pt x="310553" y="13394"/>
+                </a:lnTo>
+                <a:lnTo>
+                  <a:pt x="613305" y="13394"/>
+                </a:lnTo>
+                <a:lnTo>
+                  <a:pt x="613305" y="331987"/>
+                </a:lnTo>
+                <a:lnTo>
+                  <a:pt x="556135" y="331987"/>
+                </a:lnTo>
+                <a:lnTo>
+                  <a:pt x="556135" y="70559"/>
+                </a:lnTo>
+                <a:lnTo>
+                  <a:pt x="490453" y="70559"/>
+                </a:lnTo>
+                <a:lnTo>
+                  <a:pt x="490454" y="331987"/>
+                </a:lnTo>
+                <a:lnTo>
+                  <a:pt x="433283" y="331987"/>
+                </a:lnTo>
+                <a:lnTo>
+                  <a:pt x="433283" y="70559"/>
+                </a:lnTo>
+                <a:lnTo>
+                  <a:pt x="367724" y="70558"/>
+                </a:lnTo>
+                <a:lnTo>
+                  <a:pt x="367724" y="331987"/>
+                </a:lnTo>
+                <a:lnTo>
+                  <a:pt x="187951" y="331987"/>
+                </a:lnTo>
+                <a:lnTo>
+                  <a:pt x="187951" y="70558"/>
+                </a:lnTo>
+                <a:lnTo>
+                  <a:pt x="122651" y="70558"/>
+                </a:lnTo>
+                <a:lnTo>
+                  <a:pt x="122651" y="331987"/>
+                </a:lnTo>
+                <a:lnTo>
+                  <a:pt x="65481" y="331987"/>
+                </a:lnTo>
+                <a:lnTo>
+                  <a:pt x="65480" y="70558"/>
+                </a:lnTo>
+                <a:lnTo>
+                  <a:pt x="8308" y="70558"/>
+                </a:lnTo>
+                <a:lnTo>
+                  <a:pt x="8308" y="13394"/>
+                </a:lnTo>
+                <a:close/>
+              </a:path>
+            </a:pathLst>
+          </a:custGeom>
+          <a:solidFill>
+            <a:srgbClr val="0063BB">
+              <a:alpha val="100000"/>
+            </a:srgbClr>
+          </a:solidFill>
+          <a:ln w="12700">
+            <a:solidFill>
+              <a:srgbClr val="000000">
+                <a:alpha val="0"/>
+              </a:srgbClr>
+            </a:solidFill>
+          </a:ln>
+          <a:effectLst/>
+        </p:spPr>
+        <p:style>
+          <a:lnRef idx="2">
+            <a:schemeClr val="accent1"/>
+          </a:lnRef>
+          <a:fillRef idx="0">
+            <a:schemeClr val="accent1"/>
+          </a:fillRef>
+          <a:effectRef idx="1">
+            <a:schemeClr val="accent1"/>
+          </a:effectRef>
+          <a:fontRef idx="minor">
+            <a:schemeClr val="tx1"/>
+          </a:fontRef>
+        </p:style>
+        <p:txBody>
+          <a:bodyPr rtlCol="0" anchor="ctr"/>
+          <a:lstStyle/>
+          <a:p>
+            <a:pPr algn="ctr"/>
+            <a:endParaRPr lang="en-US"/>
+          </a:p>
+        </p:txBody>
+      </p:sp>
+      <p:pic>
+        <p:nvPicPr>
+          <p:cNvPr id="182" name="Picture 182"/>
+          <p:cNvPicPr>
+            <a:picLocks noChangeAspect="1"/>
+          </p:cNvPicPr>
+          <p:nvPr/>
+        </p:nvPicPr>
+        <p:blipFill>
+          <a:blip r:embed="rId2"/>
+          <a:stretch>
+            <a:fillRect/>
+          </a:stretch>
+        </p:blipFill>
+        <p:spPr>
+          <a:xfrm>
+            <a:off x="4960620" y="1455420"/>
+            <a:ext cx="3855720" cy="3375660"/>
+          </a:xfrm>
+          <a:prstGeom prst="rect">
+            <a:avLst/>
+          </a:prstGeom>
+        </p:spPr>
+      </p:pic>
+      <p:sp>
+        <p:nvSpPr>
+          <p:cNvPr id="2" name="TextBox 182"/>
+          <p:cNvSpPr txBox="1"/>
+          <p:nvPr/>
+        </p:nvSpPr>
+        <p:spPr>
+          <a:xfrm>
+            <a:off x="319125" y="970434"/>
+            <a:ext cx="5156206" cy="1468159"/>
+          </a:xfrm>
+          <a:prstGeom prst="rect">
+            <a:avLst/>
+          </a:prstGeom>
+          <a:noFill/>
+        </p:spPr>
+        <p:txBody>
+          <a:bodyPr wrap="square" lIns="0" tIns="0" rIns="0" bIns="0" rtlCol="0">
+            <a:spAutoFit/>
+          </a:bodyPr>
+          <a:lstStyle/>
+          <a:p>
+            <a:pPr marL="0">
+              <a:lnSpc>
+                <a:spcPct val="100000"/>
+              </a:lnSpc>
+            </a:pPr>
+            <a:r>
+              <a:rPr lang="en-US" altLang="zh-CN" sz="2500" dirty="0" err="1">
+                <a:solidFill>
+                  <a:srgbClr val="000000"/>
+                </a:solidFill>
+                <a:latin typeface="Arial"/>
+                <a:ea typeface="Arial"/>
+              </a:rPr>
+              <a:t>Vielen</a:t>
+            </a:r>
+            <a:r>
+              <a:rPr lang="en-US" altLang="zh-CN" sz="2500" spc="-55" dirty="0">
+                <a:solidFill>
+                  <a:srgbClr val="000000"/>
+                </a:solidFill>
+                <a:latin typeface="Arial"/>
+                <a:cs typeface="Arial"/>
+              </a:rPr>
+              <a:t> </a:t>
+            </a:r>
+            <a:r>
+              <a:rPr lang="en-US" altLang="zh-CN" sz="2500" dirty="0">
+                <a:solidFill>
+                  <a:srgbClr val="000000"/>
+                </a:solidFill>
+                <a:latin typeface="Arial"/>
+                <a:ea typeface="Arial"/>
+              </a:rPr>
+              <a:t>Dank</a:t>
+            </a:r>
+            <a:r>
+              <a:rPr lang="en-US" altLang="zh-CN" sz="2500" spc="-55" dirty="0">
+                <a:solidFill>
+                  <a:srgbClr val="000000"/>
+                </a:solidFill>
+                <a:latin typeface="Arial"/>
+                <a:cs typeface="Arial"/>
+              </a:rPr>
+              <a:t> </a:t>
+            </a:r>
+            <a:r>
+              <a:rPr lang="en-US" altLang="zh-CN" sz="2500" dirty="0" err="1">
+                <a:solidFill>
+                  <a:srgbClr val="000000"/>
+                </a:solidFill>
+                <a:latin typeface="Arial"/>
+                <a:ea typeface="Arial"/>
+              </a:rPr>
+              <a:t>für</a:t>
+            </a:r>
+            <a:r>
+              <a:rPr lang="en-US" altLang="zh-CN" sz="2500" spc="-55" dirty="0">
+                <a:solidFill>
+                  <a:srgbClr val="000000"/>
+                </a:solidFill>
+                <a:latin typeface="Arial"/>
+                <a:cs typeface="Arial"/>
+              </a:rPr>
+              <a:t> </a:t>
+            </a:r>
+            <a:r>
+              <a:rPr lang="en-US" altLang="zh-CN" sz="2500" dirty="0" err="1">
+                <a:solidFill>
+                  <a:srgbClr val="000000"/>
+                </a:solidFill>
+                <a:latin typeface="Arial"/>
+                <a:ea typeface="Arial"/>
+              </a:rPr>
+              <a:t>Ihre</a:t>
+            </a:r>
+            <a:r>
+              <a:rPr lang="en-US" altLang="zh-CN" sz="2500" spc="-60" dirty="0">
+                <a:solidFill>
+                  <a:srgbClr val="000000"/>
+                </a:solidFill>
+                <a:latin typeface="Arial"/>
+                <a:cs typeface="Arial"/>
+              </a:rPr>
+              <a:t> </a:t>
+            </a:r>
+            <a:r>
+              <a:rPr lang="en-US" altLang="zh-CN" sz="2500" dirty="0" err="1">
+                <a:solidFill>
+                  <a:srgbClr val="000000"/>
+                </a:solidFill>
+                <a:latin typeface="Arial"/>
+                <a:ea typeface="Arial"/>
+              </a:rPr>
+              <a:t>Aufmerksamkeit</a:t>
+            </a:r>
+            <a:endParaRPr lang="en-US" altLang="zh-CN" sz="2500" dirty="0">
+              <a:solidFill>
+                <a:srgbClr val="000000"/>
+              </a:solidFill>
+              <a:latin typeface="Arial"/>
+              <a:ea typeface="Arial"/>
+            </a:endParaRPr>
+          </a:p>
+          <a:p>
+            <a:pPr>
+              <a:lnSpc>
+                <a:spcPts val="1169"/>
+              </a:lnSpc>
+            </a:pPr>
+            <a:endParaRPr lang="en-US" dirty="0"/>
+          </a:p>
+          <a:p>
+            <a:pPr hangingPunct="0">
+              <a:lnSpc>
+                <a:spcPct val="150000"/>
+              </a:lnSpc>
+            </a:pPr>
+            <a:r>
+              <a:rPr lang="de-DE" sz="1400" dirty="0"/>
+              <a:t>Lorenzo </a:t>
+            </a:r>
+            <a:r>
+              <a:rPr lang="de-DE" sz="1400" dirty="0" err="1"/>
+              <a:t>Brazzi</a:t>
+            </a:r>
+            <a:r>
+              <a:rPr lang="de-DE" sz="1400" dirty="0"/>
+              <a:t>, Ikbal </a:t>
+            </a:r>
+            <a:r>
+              <a:rPr lang="de-DE" sz="1400" dirty="0" err="1"/>
+              <a:t>Yesiltas</a:t>
+            </a:r>
+            <a:r>
+              <a:rPr lang="de-DE" sz="1400" dirty="0"/>
+              <a:t>, Patrick Reto, Markus Zuber</a:t>
+            </a:r>
+            <a:br>
+              <a:rPr dirty="0"/>
+            </a:br>
+            <a:r>
+              <a:rPr lang="en-US" altLang="zh-CN" sz="1400" spc="-10" dirty="0" err="1">
+                <a:solidFill>
+                  <a:srgbClr val="000000"/>
+                </a:solidFill>
+                <a:latin typeface="Arial"/>
+                <a:ea typeface="Arial"/>
+              </a:rPr>
+              <a:t>Technische</a:t>
+            </a:r>
+            <a:r>
+              <a:rPr lang="en-US" altLang="zh-CN" sz="1400" spc="-5" dirty="0">
+                <a:solidFill>
+                  <a:srgbClr val="000000"/>
+                </a:solidFill>
+                <a:latin typeface="Arial"/>
+                <a:cs typeface="Arial"/>
+              </a:rPr>
+              <a:t> </a:t>
+            </a:r>
+            <a:r>
+              <a:rPr lang="en-US" altLang="zh-CN" sz="1400" spc="-5" dirty="0">
+                <a:solidFill>
+                  <a:srgbClr val="000000"/>
+                </a:solidFill>
+                <a:latin typeface="Arial"/>
+                <a:ea typeface="Arial"/>
+              </a:rPr>
+              <a:t>Universität</a:t>
+            </a:r>
+            <a:r>
+              <a:rPr lang="en-US" altLang="zh-CN" sz="1400" spc="-15" dirty="0">
+                <a:solidFill>
+                  <a:srgbClr val="000000"/>
+                </a:solidFill>
+                <a:latin typeface="Arial"/>
+                <a:cs typeface="Arial"/>
+              </a:rPr>
+              <a:t> </a:t>
+            </a:r>
+            <a:r>
+              <a:rPr lang="en-US" altLang="zh-CN" sz="1400" spc="-10" dirty="0">
+                <a:solidFill>
+                  <a:srgbClr val="000000"/>
+                </a:solidFill>
+                <a:latin typeface="Arial"/>
+                <a:ea typeface="Arial"/>
+              </a:rPr>
+              <a:t>München</a:t>
+            </a:r>
+            <a:r>
+              <a:rPr lang="en-US" altLang="zh-CN" sz="1400" dirty="0">
+                <a:solidFill>
+                  <a:srgbClr val="000000"/>
+                </a:solidFill>
+                <a:latin typeface="Arial"/>
+                <a:cs typeface="Arial"/>
+              </a:rPr>
+              <a:t> </a:t>
+            </a:r>
+            <a:br>
+              <a:rPr dirty="0"/>
+            </a:br>
+            <a:r>
+              <a:rPr lang="en-US" altLang="zh-CN" sz="1400" dirty="0">
+                <a:solidFill>
+                  <a:srgbClr val="000000"/>
+                </a:solidFill>
+                <a:latin typeface="Arial"/>
+                <a:ea typeface="Arial"/>
+              </a:rPr>
+              <a:t>München,</a:t>
+            </a:r>
+            <a:r>
+              <a:rPr lang="en-US" altLang="zh-CN" sz="1400" dirty="0">
+                <a:solidFill>
+                  <a:srgbClr val="000000"/>
+                </a:solidFill>
+                <a:latin typeface="Arial"/>
+                <a:cs typeface="Arial"/>
+              </a:rPr>
+              <a:t> </a:t>
+            </a:r>
+            <a:r>
+              <a:rPr lang="en-US" altLang="zh-CN" sz="1400" dirty="0">
+                <a:solidFill>
+                  <a:srgbClr val="000000"/>
+                </a:solidFill>
+                <a:latin typeface="Arial"/>
+                <a:ea typeface="Arial"/>
+              </a:rPr>
+              <a:t>28.11.2019</a:t>
             </a:r>
           </a:p>
         </p:txBody>
@@ -8662,6 +9216,36 @@
           </a:p>
         </p:txBody>
       </p:sp>
+      <p:pic>
+        <p:nvPicPr>
+          <p:cNvPr id="5" name="Grafik 4" descr="Ein Bild, das Screenshot enthält.&#10;&#10;Automatisch generierte Beschreibung">
+            <a:extLst>
+              <a:ext uri="{FF2B5EF4-FFF2-40B4-BE49-F238E27FC236}">
+                <a16:creationId xmlns:a16="http://schemas.microsoft.com/office/drawing/2014/main" id="{7256CF38-DE25-D84F-9D6D-FD6F0C2376DA}"/>
+              </a:ext>
+            </a:extLst>
+          </p:cNvPr>
+          <p:cNvPicPr>
+            <a:picLocks noChangeAspect="1"/>
+          </p:cNvPicPr>
+          <p:nvPr/>
+        </p:nvPicPr>
+        <p:blipFill>
+          <a:blip r:embed="rId2"/>
+          <a:stretch>
+            <a:fillRect/>
+          </a:stretch>
+        </p:blipFill>
+        <p:spPr>
+          <a:xfrm>
+            <a:off x="657231" y="1231162"/>
+            <a:ext cx="7829538" cy="3332010"/>
+          </a:xfrm>
+          <a:prstGeom prst="rect">
+            <a:avLst/>
+          </a:prstGeom>
+        </p:spPr>
+      </p:pic>
     </p:spTree>
     <p:extLst>
       <p:ext uri="{BB962C8B-B14F-4D97-AF65-F5344CB8AC3E}">
@@ -10260,533 +10844,109 @@
       </p:grpSpPr>
       <p:sp>
         <p:nvSpPr>
-          <p:cNvPr id="180" name="Freeform 180"/>
-          <p:cNvSpPr/>
-          <p:nvPr/>
+          <p:cNvPr id="4" name="Foliennummernplatzhalter 3"/>
+          <p:cNvSpPr>
+            <a:spLocks noGrp="1"/>
+          </p:cNvSpPr>
+          <p:nvPr>
+            <p:ph type="sldNum" sz="quarter" idx="11"/>
+          </p:nvPr>
+        </p:nvSpPr>
+        <p:spPr/>
+        <p:txBody>
+          <a:bodyPr/>
+          <a:lstStyle/>
+          <a:p>
+            <a:fld id="{CE58CB1E-F828-4F11-99E0-327109AF9DA4}" type="slidenum">
+              <a:rPr lang="de-DE" smtClean="0"/>
+              <a:pPr/>
+              <a:t>9</a:t>
+            </a:fld>
+            <a:endParaRPr lang="de-DE" dirty="0"/>
+          </a:p>
+        </p:txBody>
+      </p:sp>
+      <p:sp>
+        <p:nvSpPr>
+          <p:cNvPr id="6" name="Fußzeilenplatzhalter 4"/>
+          <p:cNvSpPr>
+            <a:spLocks noGrp="1"/>
+          </p:cNvSpPr>
+          <p:nvPr>
+            <p:ph type="ftr" sz="quarter" idx="12"/>
+          </p:nvPr>
+        </p:nvSpPr>
+        <p:spPr/>
+        <p:txBody>
+          <a:bodyPr/>
+          <a:lstStyle/>
+          <a:p>
+            <a:r>
+              <a:rPr lang="en-US" dirty="0" err="1"/>
+              <a:t>Xlink</a:t>
+            </a:r>
+            <a:r>
+              <a:rPr lang="en-US" dirty="0"/>
+              <a:t> | </a:t>
+            </a:r>
+            <a:r>
+              <a:rPr lang="en-US" dirty="0" err="1"/>
+              <a:t>DocBook</a:t>
+            </a:r>
+            <a:r>
+              <a:rPr lang="en-US" dirty="0"/>
+              <a:t> </a:t>
+            </a:r>
+            <a:r>
+              <a:rPr lang="en-US" dirty="0" err="1"/>
+              <a:t>Dokumentation</a:t>
+            </a:r>
+            <a:endParaRPr lang="en-US" dirty="0"/>
+          </a:p>
+        </p:txBody>
+      </p:sp>
+      <p:sp>
+        <p:nvSpPr>
+          <p:cNvPr id="3" name="Titel 2"/>
+          <p:cNvSpPr>
+            <a:spLocks noGrp="1"/>
+          </p:cNvSpPr>
+          <p:nvPr>
+            <p:ph type="title"/>
+          </p:nvPr>
         </p:nvSpPr>
         <p:spPr>
           <a:xfrm>
-            <a:off x="8210550" y="311150"/>
-            <a:ext cx="603250" cy="323850"/>
-          </a:xfrm>
-          <a:custGeom>
-            <a:avLst/>
-            <a:gdLst>
-              <a:gd name="connsiteX0" fmla="*/ 8308 w 603250"/>
-              <a:gd name="connsiteY0" fmla="*/ 13394 h 323850"/>
-              <a:gd name="connsiteX1" fmla="*/ 245253 w 603250"/>
-              <a:gd name="connsiteY1" fmla="*/ 13394 h 323850"/>
-              <a:gd name="connsiteX2" fmla="*/ 245254 w 603250"/>
-              <a:gd name="connsiteY2" fmla="*/ 274824 h 323850"/>
-              <a:gd name="connsiteX3" fmla="*/ 310553 w 603250"/>
-              <a:gd name="connsiteY3" fmla="*/ 274824 h 323850"/>
-              <a:gd name="connsiteX4" fmla="*/ 310553 w 603250"/>
-              <a:gd name="connsiteY4" fmla="*/ 13394 h 323850"/>
-              <a:gd name="connsiteX5" fmla="*/ 613305 w 603250"/>
-              <a:gd name="connsiteY5" fmla="*/ 13394 h 323850"/>
-              <a:gd name="connsiteX6" fmla="*/ 613305 w 603250"/>
-              <a:gd name="connsiteY6" fmla="*/ 331987 h 323850"/>
-              <a:gd name="connsiteX7" fmla="*/ 556135 w 603250"/>
-              <a:gd name="connsiteY7" fmla="*/ 331987 h 323850"/>
-              <a:gd name="connsiteX8" fmla="*/ 556135 w 603250"/>
-              <a:gd name="connsiteY8" fmla="*/ 70559 h 323850"/>
-              <a:gd name="connsiteX9" fmla="*/ 490453 w 603250"/>
-              <a:gd name="connsiteY9" fmla="*/ 70559 h 323850"/>
-              <a:gd name="connsiteX10" fmla="*/ 490454 w 603250"/>
-              <a:gd name="connsiteY10" fmla="*/ 331987 h 323850"/>
-              <a:gd name="connsiteX11" fmla="*/ 433283 w 603250"/>
-              <a:gd name="connsiteY11" fmla="*/ 331987 h 323850"/>
-              <a:gd name="connsiteX12" fmla="*/ 433283 w 603250"/>
-              <a:gd name="connsiteY12" fmla="*/ 70559 h 323850"/>
-              <a:gd name="connsiteX13" fmla="*/ 367724 w 603250"/>
-              <a:gd name="connsiteY13" fmla="*/ 70558 h 323850"/>
-              <a:gd name="connsiteX14" fmla="*/ 367724 w 603250"/>
-              <a:gd name="connsiteY14" fmla="*/ 331987 h 323850"/>
-              <a:gd name="connsiteX15" fmla="*/ 187951 w 603250"/>
-              <a:gd name="connsiteY15" fmla="*/ 331987 h 323850"/>
-              <a:gd name="connsiteX16" fmla="*/ 187951 w 603250"/>
-              <a:gd name="connsiteY16" fmla="*/ 70558 h 323850"/>
-              <a:gd name="connsiteX17" fmla="*/ 122651 w 603250"/>
-              <a:gd name="connsiteY17" fmla="*/ 70558 h 323850"/>
-              <a:gd name="connsiteX18" fmla="*/ 122651 w 603250"/>
-              <a:gd name="connsiteY18" fmla="*/ 331987 h 323850"/>
-              <a:gd name="connsiteX19" fmla="*/ 65481 w 603250"/>
-              <a:gd name="connsiteY19" fmla="*/ 331987 h 323850"/>
-              <a:gd name="connsiteX20" fmla="*/ 65480 w 603250"/>
-              <a:gd name="connsiteY20" fmla="*/ 70558 h 323850"/>
-              <a:gd name="connsiteX21" fmla="*/ 8308 w 603250"/>
-              <a:gd name="connsiteY21" fmla="*/ 70558 h 323850"/>
-              <a:gd name="connsiteX22" fmla="*/ 8308 w 603250"/>
-              <a:gd name="connsiteY22" fmla="*/ 13394 h 323850"/>
-            </a:gdLst>
-            <a:ahLst/>
-            <a:cxnLst>
-              <a:cxn ang="0">
-                <a:pos x="connsiteX0" y="connsiteY0"/>
-              </a:cxn>
-              <a:cxn ang="0">
-                <a:pos x="connsiteX1" y="connsiteY1"/>
-              </a:cxn>
-              <a:cxn ang="0">
-                <a:pos x="connsiteX2" y="connsiteY2"/>
-              </a:cxn>
-              <a:cxn ang="0">
-                <a:pos x="connsiteX3" y="connsiteY3"/>
-              </a:cxn>
-              <a:cxn ang="0">
-                <a:pos x="connsiteX4" y="connsiteY4"/>
-              </a:cxn>
-              <a:cxn ang="0">
-                <a:pos x="connsiteX5" y="connsiteY5"/>
-              </a:cxn>
-              <a:cxn ang="0">
-                <a:pos x="connsiteX6" y="connsiteY6"/>
-              </a:cxn>
-              <a:cxn ang="0">
-                <a:pos x="connsiteX7" y="connsiteY7"/>
-              </a:cxn>
-              <a:cxn ang="0">
-                <a:pos x="connsiteX8" y="connsiteY8"/>
-              </a:cxn>
-              <a:cxn ang="0">
-                <a:pos x="connsiteX9" y="connsiteY9"/>
-              </a:cxn>
-              <a:cxn ang="0">
-                <a:pos x="connsiteX10" y="connsiteY10"/>
-              </a:cxn>
-              <a:cxn ang="0">
-                <a:pos x="connsiteX11" y="connsiteY11"/>
-              </a:cxn>
-              <a:cxn ang="0">
-                <a:pos x="connsiteX12" y="connsiteY12"/>
-              </a:cxn>
-              <a:cxn ang="0">
-                <a:pos x="connsiteX13" y="connsiteY13"/>
-              </a:cxn>
-              <a:cxn ang="0">
-                <a:pos x="connsiteX14" y="connsiteY14"/>
-              </a:cxn>
-              <a:cxn ang="0">
-                <a:pos x="connsiteX15" y="connsiteY15"/>
-              </a:cxn>
-              <a:cxn ang="0">
-                <a:pos x="connsiteX16" y="connsiteY16"/>
-              </a:cxn>
-              <a:cxn ang="0">
-                <a:pos x="connsiteX17" y="connsiteY17"/>
-              </a:cxn>
-              <a:cxn ang="0">
-                <a:pos x="connsiteX18" y="connsiteY18"/>
-              </a:cxn>
-              <a:cxn ang="0">
-                <a:pos x="connsiteX19" y="connsiteY19"/>
-              </a:cxn>
-              <a:cxn ang="0">
-                <a:pos x="connsiteX20" y="connsiteY20"/>
-              </a:cxn>
-              <a:cxn ang="0">
-                <a:pos x="connsiteX21" y="connsiteY21"/>
-              </a:cxn>
-              <a:cxn ang="0">
-                <a:pos x="connsiteX22" y="connsiteY22"/>
-              </a:cxn>
-            </a:cxnLst>
-            <a:rect l="l" t="t" r="r" b="b"/>
-            <a:pathLst>
-              <a:path w="603250" h="323850">
-                <a:moveTo>
-                  <a:pt x="8308" y="13394"/>
-                </a:moveTo>
-                <a:lnTo>
-                  <a:pt x="245253" y="13394"/>
-                </a:lnTo>
-                <a:lnTo>
-                  <a:pt x="245254" y="274824"/>
-                </a:lnTo>
-                <a:lnTo>
-                  <a:pt x="310553" y="274824"/>
-                </a:lnTo>
-                <a:lnTo>
-                  <a:pt x="310553" y="13394"/>
-                </a:lnTo>
-                <a:lnTo>
-                  <a:pt x="613305" y="13394"/>
-                </a:lnTo>
-                <a:lnTo>
-                  <a:pt x="613305" y="331987"/>
-                </a:lnTo>
-                <a:lnTo>
-                  <a:pt x="556135" y="331987"/>
-                </a:lnTo>
-                <a:lnTo>
-                  <a:pt x="556135" y="70559"/>
-                </a:lnTo>
-                <a:lnTo>
-                  <a:pt x="490453" y="70559"/>
-                </a:lnTo>
-                <a:lnTo>
-                  <a:pt x="490454" y="331987"/>
-                </a:lnTo>
-                <a:lnTo>
-                  <a:pt x="433283" y="331987"/>
-                </a:lnTo>
-                <a:lnTo>
-                  <a:pt x="433283" y="70559"/>
-                </a:lnTo>
-                <a:lnTo>
-                  <a:pt x="367724" y="70558"/>
-                </a:lnTo>
-                <a:lnTo>
-                  <a:pt x="367724" y="331987"/>
-                </a:lnTo>
-                <a:lnTo>
-                  <a:pt x="187951" y="331987"/>
-                </a:lnTo>
-                <a:lnTo>
-                  <a:pt x="187951" y="70558"/>
-                </a:lnTo>
-                <a:lnTo>
-                  <a:pt x="122651" y="70558"/>
-                </a:lnTo>
-                <a:lnTo>
-                  <a:pt x="122651" y="331987"/>
-                </a:lnTo>
-                <a:lnTo>
-                  <a:pt x="65481" y="331987"/>
-                </a:lnTo>
-                <a:lnTo>
-                  <a:pt x="65480" y="70558"/>
-                </a:lnTo>
-                <a:lnTo>
-                  <a:pt x="8308" y="70558"/>
-                </a:lnTo>
-                <a:lnTo>
-                  <a:pt x="8308" y="13394"/>
-                </a:lnTo>
-                <a:close/>
-              </a:path>
-            </a:pathLst>
-          </a:custGeom>
-          <a:solidFill>
-            <a:srgbClr val="0063BB">
-              <a:alpha val="100000"/>
-            </a:srgbClr>
-          </a:solidFill>
-          <a:ln w="12700">
-            <a:solidFill>
-              <a:srgbClr val="000000">
-                <a:alpha val="0"/>
-              </a:srgbClr>
-            </a:solidFill>
-          </a:ln>
-          <a:effectLst/>
-        </p:spPr>
-        <p:style>
-          <a:lnRef idx="2">
-            <a:schemeClr val="accent1"/>
-          </a:lnRef>
-          <a:fillRef idx="0">
-            <a:schemeClr val="accent1"/>
-          </a:fillRef>
-          <a:effectRef idx="1">
-            <a:schemeClr val="accent1"/>
-          </a:effectRef>
-          <a:fontRef idx="minor">
-            <a:schemeClr val="tx1"/>
-          </a:fontRef>
-        </p:style>
-        <p:txBody>
-          <a:bodyPr rtlCol="0" anchor="ctr"/>
-          <a:lstStyle/>
-          <a:p>
-            <a:pPr algn="ctr"/>
-            <a:endParaRPr lang="en-US"/>
-          </a:p>
-        </p:txBody>
-      </p:sp>
-      <p:pic>
-        <p:nvPicPr>
-          <p:cNvPr id="182" name="Picture 182"/>
-          <p:cNvPicPr>
-            <a:picLocks noChangeAspect="1"/>
-          </p:cNvPicPr>
-          <p:nvPr/>
-        </p:nvPicPr>
-        <p:blipFill>
-          <a:blip r:embed="rId2"/>
-          <a:stretch>
-            <a:fillRect/>
-          </a:stretch>
-        </p:blipFill>
-        <p:spPr>
-          <a:xfrm>
-            <a:off x="4960620" y="1455420"/>
-            <a:ext cx="3855720" cy="3375660"/>
+            <a:off x="319091" y="745751"/>
+            <a:ext cx="8508999" cy="307777"/>
           </a:xfrm>
           <a:prstGeom prst="rect">
             <a:avLst/>
           </a:prstGeom>
         </p:spPr>
-      </p:pic>
-      <p:sp>
-        <p:nvSpPr>
-          <p:cNvPr id="2" name="TextBox 182"/>
-          <p:cNvSpPr txBox="1"/>
-          <p:nvPr/>
-        </p:nvSpPr>
-        <p:spPr>
-          <a:xfrm>
-            <a:off x="319125" y="970434"/>
-            <a:ext cx="5156206" cy="1468159"/>
-          </a:xfrm>
-          <a:prstGeom prst="rect">
-            <a:avLst/>
-          </a:prstGeom>
-          <a:noFill/>
-        </p:spPr>
-        <p:txBody>
-          <a:bodyPr wrap="square" lIns="0" tIns="0" rIns="0" bIns="0" rtlCol="0">
-            <a:spAutoFit/>
-          </a:bodyPr>
+        <p:txBody>
+          <a:bodyPr/>
           <a:lstStyle/>
           <a:p>
-            <a:pPr marL="0">
-              <a:lnSpc>
-                <a:spcPct val="100000"/>
-              </a:lnSpc>
-            </a:pPr>
-            <a:r>
-              <a:rPr lang="en-US" altLang="zh-CN" sz="2500" dirty="0" err="1">
-                <a:solidFill>
-                  <a:srgbClr val="000000"/>
-                </a:solidFill>
-                <a:latin typeface="Arial"/>
-                <a:ea typeface="Arial"/>
-              </a:rPr>
-              <a:t>Vielen</a:t>
-            </a:r>
-            <a:r>
-              <a:rPr lang="en-US" altLang="zh-CN" sz="2500" spc="-55" dirty="0">
-                <a:solidFill>
-                  <a:srgbClr val="000000"/>
-                </a:solidFill>
-                <a:latin typeface="Arial"/>
-                <a:cs typeface="Arial"/>
-              </a:rPr>
-              <a:t> </a:t>
-            </a:r>
-            <a:r>
-              <a:rPr lang="en-US" altLang="zh-CN" sz="2500" dirty="0">
-                <a:solidFill>
-                  <a:srgbClr val="000000"/>
-                </a:solidFill>
-                <a:latin typeface="Arial"/>
-                <a:ea typeface="Arial"/>
-              </a:rPr>
-              <a:t>Dank</a:t>
-            </a:r>
-            <a:r>
-              <a:rPr lang="en-US" altLang="zh-CN" sz="2500" spc="-55" dirty="0">
-                <a:solidFill>
-                  <a:srgbClr val="000000"/>
-                </a:solidFill>
-                <a:latin typeface="Arial"/>
-                <a:cs typeface="Arial"/>
-              </a:rPr>
-              <a:t> </a:t>
-            </a:r>
-            <a:r>
-              <a:rPr lang="en-US" altLang="zh-CN" sz="2500" dirty="0" err="1">
-                <a:solidFill>
-                  <a:srgbClr val="000000"/>
-                </a:solidFill>
-                <a:latin typeface="Arial"/>
-                <a:ea typeface="Arial"/>
-              </a:rPr>
-              <a:t>für</a:t>
-            </a:r>
-            <a:r>
-              <a:rPr lang="en-US" altLang="zh-CN" sz="2500" spc="-55" dirty="0">
-                <a:solidFill>
-                  <a:srgbClr val="000000"/>
-                </a:solidFill>
-                <a:latin typeface="Arial"/>
-                <a:cs typeface="Arial"/>
-              </a:rPr>
-              <a:t> </a:t>
-            </a:r>
-            <a:r>
-              <a:rPr lang="en-US" altLang="zh-CN" sz="2500" dirty="0" err="1">
-                <a:solidFill>
-                  <a:srgbClr val="000000"/>
-                </a:solidFill>
-                <a:latin typeface="Arial"/>
-                <a:ea typeface="Arial"/>
-              </a:rPr>
-              <a:t>Ihre</a:t>
-            </a:r>
-            <a:r>
-              <a:rPr lang="en-US" altLang="zh-CN" sz="2500" spc="-60" dirty="0">
-                <a:solidFill>
-                  <a:srgbClr val="000000"/>
-                </a:solidFill>
-                <a:latin typeface="Arial"/>
-                <a:cs typeface="Arial"/>
-              </a:rPr>
-              <a:t> </a:t>
-            </a:r>
-            <a:r>
-              <a:rPr lang="en-US" altLang="zh-CN" sz="2500" dirty="0" err="1">
-                <a:solidFill>
-                  <a:srgbClr val="000000"/>
-                </a:solidFill>
-                <a:latin typeface="Arial"/>
-                <a:ea typeface="Arial"/>
-              </a:rPr>
-              <a:t>Aufmerksamkeit</a:t>
-            </a:r>
-            <a:endParaRPr lang="en-US" altLang="zh-CN" sz="2500" dirty="0">
-              <a:solidFill>
-                <a:srgbClr val="000000"/>
-              </a:solidFill>
-              <a:latin typeface="Arial"/>
-              <a:ea typeface="Arial"/>
-            </a:endParaRPr>
-          </a:p>
-          <a:p>
-            <a:pPr>
-              <a:lnSpc>
-                <a:spcPts val="1169"/>
-              </a:lnSpc>
-            </a:pPr>
-            <a:endParaRPr lang="en-US" dirty="0"/>
-          </a:p>
-          <a:p>
-            <a:pPr hangingPunct="0">
-              <a:lnSpc>
-                <a:spcPct val="150000"/>
-              </a:lnSpc>
-            </a:pPr>
-            <a:r>
-              <a:rPr lang="de-DE" sz="1400" dirty="0"/>
-              <a:t>Lorenzo </a:t>
-            </a:r>
-            <a:r>
-              <a:rPr lang="de-DE" sz="1400" dirty="0" err="1"/>
-              <a:t>Brazzi</a:t>
-            </a:r>
-            <a:r>
-              <a:rPr lang="de-DE" sz="1400" dirty="0"/>
-              <a:t>, Ikbal </a:t>
-            </a:r>
-            <a:r>
-              <a:rPr lang="de-DE" sz="1400" dirty="0" err="1"/>
-              <a:t>Yesiltas</a:t>
-            </a:r>
-            <a:r>
-              <a:rPr lang="de-DE" sz="1400" dirty="0"/>
-              <a:t>, Patrick Reto, Markus Zuber</a:t>
-            </a:r>
-            <a:br>
-              <a:rPr dirty="0"/>
-            </a:br>
-            <a:r>
-              <a:rPr lang="en-US" altLang="zh-CN" sz="1400" spc="-10" dirty="0" err="1">
-                <a:solidFill>
-                  <a:srgbClr val="000000"/>
-                </a:solidFill>
-                <a:latin typeface="Arial"/>
-                <a:ea typeface="Arial"/>
-              </a:rPr>
-              <a:t>Technische</a:t>
-            </a:r>
-            <a:r>
-              <a:rPr lang="en-US" altLang="zh-CN" sz="1400" spc="-5" dirty="0">
-                <a:solidFill>
-                  <a:srgbClr val="000000"/>
-                </a:solidFill>
-                <a:latin typeface="Arial"/>
-                <a:cs typeface="Arial"/>
-              </a:rPr>
-              <a:t> </a:t>
-            </a:r>
-            <a:r>
-              <a:rPr lang="en-US" altLang="zh-CN" sz="1400" spc="-5" dirty="0">
-                <a:solidFill>
-                  <a:srgbClr val="000000"/>
-                </a:solidFill>
-                <a:latin typeface="Arial"/>
-                <a:ea typeface="Arial"/>
-              </a:rPr>
-              <a:t>Universität</a:t>
-            </a:r>
-            <a:r>
-              <a:rPr lang="en-US" altLang="zh-CN" sz="1400" spc="-15" dirty="0">
-                <a:solidFill>
-                  <a:srgbClr val="000000"/>
-                </a:solidFill>
-                <a:latin typeface="Arial"/>
-                <a:cs typeface="Arial"/>
-              </a:rPr>
-              <a:t> </a:t>
-            </a:r>
-            <a:r>
-              <a:rPr lang="en-US" altLang="zh-CN" sz="1400" spc="-10" dirty="0">
-                <a:solidFill>
-                  <a:srgbClr val="000000"/>
-                </a:solidFill>
-                <a:latin typeface="Arial"/>
-                <a:ea typeface="Arial"/>
-              </a:rPr>
-              <a:t>München</a:t>
-            </a:r>
-            <a:r>
-              <a:rPr lang="en-US" altLang="zh-CN" sz="1400" dirty="0">
-                <a:solidFill>
-                  <a:srgbClr val="000000"/>
-                </a:solidFill>
-                <a:latin typeface="Arial"/>
-                <a:cs typeface="Arial"/>
-              </a:rPr>
-              <a:t> </a:t>
-            </a:r>
-            <a:br>
-              <a:rPr dirty="0"/>
-            </a:br>
-            <a:r>
-              <a:rPr lang="en-US" altLang="zh-CN" sz="1400" dirty="0">
-                <a:solidFill>
-                  <a:srgbClr val="000000"/>
-                </a:solidFill>
-                <a:latin typeface="Arial"/>
-                <a:ea typeface="Arial"/>
-              </a:rPr>
-              <a:t>München,</a:t>
-            </a:r>
-            <a:r>
-              <a:rPr lang="en-US" altLang="zh-CN" sz="1400" dirty="0">
-                <a:solidFill>
-                  <a:srgbClr val="000000"/>
-                </a:solidFill>
-                <a:latin typeface="Arial"/>
-                <a:cs typeface="Arial"/>
-              </a:rPr>
-              <a:t> </a:t>
-            </a:r>
-            <a:r>
-              <a:rPr lang="en-US" altLang="zh-CN" sz="1400" dirty="0">
-                <a:solidFill>
-                  <a:srgbClr val="000000"/>
-                </a:solidFill>
-                <a:latin typeface="Arial"/>
-                <a:ea typeface="Arial"/>
-              </a:rPr>
-              <a:t>28.11.2019</a:t>
-            </a:r>
+            <a:pPr algn="ctr"/>
+            <a:r>
+              <a:rPr lang="de-DE" dirty="0"/>
+              <a:t>Ausblick MVC im </a:t>
+            </a:r>
+            <a:r>
+              <a:rPr lang="de-DE" dirty="0" err="1"/>
+              <a:t>DocBook</a:t>
+            </a:r>
+            <a:endParaRPr lang="de-DE" dirty="0"/>
           </a:p>
         </p:txBody>
       </p:sp>
     </p:spTree>
+    <p:extLst>
+      <p:ext uri="{BB962C8B-B14F-4D97-AF65-F5344CB8AC3E}">
+        <p14:creationId xmlns:p14="http://schemas.microsoft.com/office/powerpoint/2010/main" val="2914764933"/>
+      </p:ext>
+    </p:extLst>
   </p:cSld>
   <p:clrMapOvr>
     <a:masterClrMapping/>

</xml_diff>